<commit_message>
updated the log file message
</commit_message>
<xml_diff>
--- a/Data/Output/Robotic Process Automation PMO.pptx
+++ b/Data/Output/Robotic Process Automation PMO.pptx
@@ -213,7 +213,7 @@
           <a:p>
             <a:fld id="{4AA46FC0-048C-40D8-958B-7775FA2711F6}" type="datetimeFigureOut">
               <a:rPr lang="en-US" smtClean="0"/>
-              <a:t>5/18/2020</a:t>
+              <a:t>5/19/2020</a:t>
             </a:fld>
             <a:endParaRPr lang="en-US"/>
           </a:p>
@@ -557,7 +557,7 @@
           <a:p>
             <a:fld id="{31D2A231-A7A4-4168-91EA-2B6389CA866E}" type="datetimeFigureOut">
               <a:rPr lang="en-US" smtClean="0"/>
-              <a:t>5/18/2020</a:t>
+              <a:t>5/19/2020</a:t>
             </a:fld>
             <a:endParaRPr lang="en-US"/>
           </a:p>
@@ -840,7 +840,7 @@
           <a:p>
             <a:fld id="{31D2A231-A7A4-4168-91EA-2B6389CA866E}" type="datetimeFigureOut">
               <a:rPr lang="en-US" smtClean="0"/>
-              <a:t>5/18/2020</a:t>
+              <a:t>5/19/2020</a:t>
             </a:fld>
             <a:endParaRPr lang="en-US"/>
           </a:p>
@@ -1048,7 +1048,7 @@
           <a:p>
             <a:fld id="{31D2A231-A7A4-4168-91EA-2B6389CA866E}" type="datetimeFigureOut">
               <a:rPr lang="en-US" smtClean="0"/>
-              <a:t>5/18/2020</a:t>
+              <a:t>5/19/2020</a:t>
             </a:fld>
             <a:endParaRPr lang="en-US"/>
           </a:p>
@@ -1598,7 +1598,7 @@
           <a:p>
             <a:fld id="{31D2A231-A7A4-4168-91EA-2B6389CA866E}" type="datetimeFigureOut">
               <a:rPr lang="en-US" smtClean="0"/>
-              <a:t>5/18/2020</a:t>
+              <a:t>5/19/2020</a:t>
             </a:fld>
             <a:endParaRPr lang="en-US"/>
           </a:p>
@@ -1863,7 +1863,7 @@
           <a:p>
             <a:fld id="{31D2A231-A7A4-4168-91EA-2B6389CA866E}" type="datetimeFigureOut">
               <a:rPr lang="en-US" smtClean="0"/>
-              <a:t>5/18/2020</a:t>
+              <a:t>5/19/2020</a:t>
             </a:fld>
             <a:endParaRPr lang="en-US"/>
           </a:p>
@@ -2275,7 +2275,7 @@
           <a:p>
             <a:fld id="{31D2A231-A7A4-4168-91EA-2B6389CA866E}" type="datetimeFigureOut">
               <a:rPr lang="en-US" smtClean="0"/>
-              <a:t>5/18/2020</a:t>
+              <a:t>5/19/2020</a:t>
             </a:fld>
             <a:endParaRPr lang="en-US"/>
           </a:p>
@@ -2416,7 +2416,7 @@
           <a:p>
             <a:fld id="{31D2A231-A7A4-4168-91EA-2B6389CA866E}" type="datetimeFigureOut">
               <a:rPr lang="en-US" smtClean="0"/>
-              <a:t>5/18/2020</a:t>
+              <a:t>5/19/2020</a:t>
             </a:fld>
             <a:endParaRPr lang="en-US"/>
           </a:p>
@@ -2529,7 +2529,7 @@
           <a:p>
             <a:fld id="{31D2A231-A7A4-4168-91EA-2B6389CA866E}" type="datetimeFigureOut">
               <a:rPr lang="en-US" smtClean="0"/>
-              <a:t>5/18/2020</a:t>
+              <a:t>5/19/2020</a:t>
             </a:fld>
             <a:endParaRPr lang="en-US"/>
           </a:p>
@@ -2840,7 +2840,7 @@
           <a:p>
             <a:fld id="{31D2A231-A7A4-4168-91EA-2B6389CA866E}" type="datetimeFigureOut">
               <a:rPr lang="en-US" smtClean="0"/>
-              <a:t>5/18/2020</a:t>
+              <a:t>5/19/2020</a:t>
             </a:fld>
             <a:endParaRPr lang="en-US"/>
           </a:p>
@@ -3128,7 +3128,7 @@
           <a:p>
             <a:fld id="{31D2A231-A7A4-4168-91EA-2B6389CA866E}" type="datetimeFigureOut">
               <a:rPr lang="en-US" smtClean="0"/>
-              <a:t>5/18/2020</a:t>
+              <a:t>5/19/2020</a:t>
             </a:fld>
             <a:endParaRPr lang="en-US"/>
           </a:p>
@@ -3369,7 +3369,7 @@
           <a:p>
             <a:fld id="{31D2A231-A7A4-4168-91EA-2B6389CA866E}" type="datetimeFigureOut">
               <a:rPr lang="en-US" smtClean="0"/>
-              <a:t>5/18/2020</a:t>
+              <a:t>5/19/2020</a:t>
             </a:fld>
             <a:endParaRPr lang="en-US"/>
           </a:p>
@@ -3868,7 +3868,7 @@
           <p:cNvPr id="3" name="TextBox 2">
             <a:extLst>
               <a:ext uri="{FF2B5EF4-FFF2-40B4-BE49-F238E27FC236}">
-                <a16:creationId xmlns:a16="http://schemas.microsoft.com/office/drawing/2014/main" id="{892033A0-00E2-4DB7-8972-499EC17FAC2E}"/>
+                <a16:creationId xmlns:a16="http://schemas.microsoft.com/office/drawing/2014/main" id="{BA58B07F-C154-40F0-8C07-A865970E7B75}"/>
               </a:ext>
             </a:extLst>
           </p:cNvPr>
@@ -3895,7 +3895,7 @@
               <a:rPr lang="en-US" sz="2800">
                 <a:latin typeface="Calibri" panose="020F0502020204030204" pitchFamily="34" charset="0"/>
               </a:rPr>
-              <a:t>Prepared on  - 05/18/20</a:t>
+              <a:t>Prepared on  - 05/19/20</a:t>
             </a:r>
           </a:p>
         </p:txBody>
@@ -3969,7 +3969,7 @@
           <p:cNvPr id="3" name="Table Placeholder 2">
             <a:extLst>
               <a:ext uri="{FF2B5EF4-FFF2-40B4-BE49-F238E27FC236}">
-                <a16:creationId xmlns:a16="http://schemas.microsoft.com/office/drawing/2014/main" id="{7FDBBD8F-4438-473A-ACCD-920B88DA7663}"/>
+                <a16:creationId xmlns:a16="http://schemas.microsoft.com/office/drawing/2014/main" id="{2E78C6A5-9605-4303-9F45-F52223FA5A5A}"/>
               </a:ext>
             </a:extLst>
           </p:cNvPr>
@@ -3980,7 +3980,7 @@
             <p:ph type="tbl" sz="quarter" idx="13"/>
             <p:extLst>
               <p:ext uri="{D42A27DB-BD31-4B8C-83A1-F6EECF244321}">
-                <p14:modId xmlns:p14="http://schemas.microsoft.com/office/powerpoint/2010/main" val="3071430381"/>
+                <p14:modId xmlns:p14="http://schemas.microsoft.com/office/powerpoint/2010/main" val="758222994"/>
               </p:ext>
             </p:extLst>
           </p:nvPr>
@@ -3999,14 +3999,14 @@
                 <a:gridCol w="5040313">
                   <a:extLst>
                     <a:ext uri="{9D8B030D-6E8A-4147-A177-3AD203B41FA5}">
-                      <a16:colId xmlns:a16="http://schemas.microsoft.com/office/drawing/2014/main" val="4160294097"/>
+                      <a16:colId xmlns:a16="http://schemas.microsoft.com/office/drawing/2014/main" val="2747770030"/>
                     </a:ext>
                   </a:extLst>
                 </a:gridCol>
                 <a:gridCol w="5040313">
                   <a:extLst>
                     <a:ext uri="{9D8B030D-6E8A-4147-A177-3AD203B41FA5}">
-                      <a16:colId xmlns:a16="http://schemas.microsoft.com/office/drawing/2014/main" val="3845005585"/>
+                      <a16:colId xmlns:a16="http://schemas.microsoft.com/office/drawing/2014/main" val="2452530159"/>
                     </a:ext>
                   </a:extLst>
                 </a:gridCol>
@@ -4040,7 +4040,7 @@
                 </a:tc>
                 <a:extLst>
                   <a:ext uri="{0D108BD9-81ED-4DB2-BD59-A6C34878D82A}">
-                    <a16:rowId xmlns:a16="http://schemas.microsoft.com/office/drawing/2014/main" val="4026858583"/>
+                    <a16:rowId xmlns:a16="http://schemas.microsoft.com/office/drawing/2014/main" val="1737684824"/>
                   </a:ext>
                 </a:extLst>
               </a:tr>
@@ -4073,7 +4073,7 @@
                 </a:tc>
                 <a:extLst>
                   <a:ext uri="{0D108BD9-81ED-4DB2-BD59-A6C34878D82A}">
-                    <a16:rowId xmlns:a16="http://schemas.microsoft.com/office/drawing/2014/main" val="2555291870"/>
+                    <a16:rowId xmlns:a16="http://schemas.microsoft.com/office/drawing/2014/main" val="3045666924"/>
                   </a:ext>
                 </a:extLst>
               </a:tr>
@@ -4106,7 +4106,7 @@
                 </a:tc>
                 <a:extLst>
                   <a:ext uri="{0D108BD9-81ED-4DB2-BD59-A6C34878D82A}">
-                    <a16:rowId xmlns:a16="http://schemas.microsoft.com/office/drawing/2014/main" val="823576752"/>
+                    <a16:rowId xmlns:a16="http://schemas.microsoft.com/office/drawing/2014/main" val="2842406944"/>
                   </a:ext>
                 </a:extLst>
               </a:tr>
@@ -4119,7 +4119,7 @@
           <p:cNvPr id="4" name="TextBox 3">
             <a:extLst>
               <a:ext uri="{FF2B5EF4-FFF2-40B4-BE49-F238E27FC236}">
-                <a16:creationId xmlns:a16="http://schemas.microsoft.com/office/drawing/2014/main" id="{4BE0F865-8BBD-4321-B532-9F64BA36D019}"/>
+                <a16:creationId xmlns:a16="http://schemas.microsoft.com/office/drawing/2014/main" id="{EF18E6E9-3659-47EA-8EF3-C3627F1FF287}"/>
               </a:ext>
             </a:extLst>
           </p:cNvPr>
@@ -4146,7 +4146,7 @@
               <a:rPr lang="en-US" sz="2800">
                 <a:latin typeface="Calibri" panose="020F0502020204030204" pitchFamily="34" charset="0"/>
               </a:rPr>
-              <a:t>Accomplishments for Week of 05/11/20 - 05/18/20</a:t>
+              <a:t>Accomplishments for Week of 05/12/20 - 05/19/20</a:t>
             </a:r>
           </a:p>
         </p:txBody>
@@ -4220,7 +4220,7 @@
           <p:cNvPr id="2" name="Table Placeholder 1">
             <a:extLst>
               <a:ext uri="{FF2B5EF4-FFF2-40B4-BE49-F238E27FC236}">
-                <a16:creationId xmlns:a16="http://schemas.microsoft.com/office/drawing/2014/main" id="{3A389789-F12A-4375-BA99-121AF57A2B86}"/>
+                <a16:creationId xmlns:a16="http://schemas.microsoft.com/office/drawing/2014/main" id="{FA0439FD-DA16-41E8-A669-6842543EBDA9}"/>
               </a:ext>
             </a:extLst>
           </p:cNvPr>
@@ -4231,7 +4231,7 @@
             <p:ph type="tbl" sz="quarter" idx="13"/>
             <p:extLst>
               <p:ext uri="{D42A27DB-BD31-4B8C-83A1-F6EECF244321}">
-                <p14:modId xmlns:p14="http://schemas.microsoft.com/office/powerpoint/2010/main" val="3967578165"/>
+                <p14:modId xmlns:p14="http://schemas.microsoft.com/office/powerpoint/2010/main" val="2284951169"/>
               </p:ext>
             </p:extLst>
           </p:nvPr>
@@ -4250,21 +4250,21 @@
                 <a:gridCol w="3360208">
                   <a:extLst>
                     <a:ext uri="{9D8B030D-6E8A-4147-A177-3AD203B41FA5}">
-                      <a16:colId xmlns:a16="http://schemas.microsoft.com/office/drawing/2014/main" val="1717079206"/>
+                      <a16:colId xmlns:a16="http://schemas.microsoft.com/office/drawing/2014/main" val="1251423113"/>
                     </a:ext>
                   </a:extLst>
                 </a:gridCol>
                 <a:gridCol w="3360208">
                   <a:extLst>
                     <a:ext uri="{9D8B030D-6E8A-4147-A177-3AD203B41FA5}">
-                      <a16:colId xmlns:a16="http://schemas.microsoft.com/office/drawing/2014/main" val="1305565806"/>
+                      <a16:colId xmlns:a16="http://schemas.microsoft.com/office/drawing/2014/main" val="2133673424"/>
                     </a:ext>
                   </a:extLst>
                 </a:gridCol>
                 <a:gridCol w="3360208">
                   <a:extLst>
                     <a:ext uri="{9D8B030D-6E8A-4147-A177-3AD203B41FA5}">
-                      <a16:colId xmlns:a16="http://schemas.microsoft.com/office/drawing/2014/main" val="2347854147"/>
+                      <a16:colId xmlns:a16="http://schemas.microsoft.com/office/drawing/2014/main" val="1948167439"/>
                     </a:ext>
                   </a:extLst>
                 </a:gridCol>
@@ -4311,7 +4311,7 @@
                 </a:tc>
                 <a:extLst>
                   <a:ext uri="{0D108BD9-81ED-4DB2-BD59-A6C34878D82A}">
-                    <a16:rowId xmlns:a16="http://schemas.microsoft.com/office/drawing/2014/main" val="3249782464"/>
+                    <a16:rowId xmlns:a16="http://schemas.microsoft.com/office/drawing/2014/main" val="4080355751"/>
                   </a:ext>
                 </a:extLst>
               </a:tr>
@@ -4357,7 +4357,7 @@
                 </a:tc>
                 <a:extLst>
                   <a:ext uri="{0D108BD9-81ED-4DB2-BD59-A6C34878D82A}">
-                    <a16:rowId xmlns:a16="http://schemas.microsoft.com/office/drawing/2014/main" val="2948744114"/>
+                    <a16:rowId xmlns:a16="http://schemas.microsoft.com/office/drawing/2014/main" val="2477040526"/>
                   </a:ext>
                 </a:extLst>
               </a:tr>
@@ -4403,7 +4403,7 @@
                 </a:tc>
                 <a:extLst>
                   <a:ext uri="{0D108BD9-81ED-4DB2-BD59-A6C34878D82A}">
-                    <a16:rowId xmlns:a16="http://schemas.microsoft.com/office/drawing/2014/main" val="800161080"/>
+                    <a16:rowId xmlns:a16="http://schemas.microsoft.com/office/drawing/2014/main" val="2580351142"/>
                   </a:ext>
                 </a:extLst>
               </a:tr>
@@ -4416,7 +4416,7 @@
           <p:cNvPr id="3" name="TextBox 2">
             <a:extLst>
               <a:ext uri="{FF2B5EF4-FFF2-40B4-BE49-F238E27FC236}">
-                <a16:creationId xmlns:a16="http://schemas.microsoft.com/office/drawing/2014/main" id="{F0C5AFD4-C1E1-4885-8209-6D7C0AEF2ED4}"/>
+                <a16:creationId xmlns:a16="http://schemas.microsoft.com/office/drawing/2014/main" id="{E5F45E24-45DE-4439-ADB2-41841A93503A}"/>
               </a:ext>
             </a:extLst>
           </p:cNvPr>
@@ -4443,7 +4443,7 @@
               <a:rPr lang="en-US" sz="2800">
                 <a:latin typeface="Calibri" panose="020F0502020204030204" pitchFamily="34" charset="0"/>
               </a:rPr>
-              <a:t>Risk Register as of  - 05/18/20</a:t>
+              <a:t>Risk Register as of  - 05/19/20</a:t>
             </a:r>
           </a:p>
         </p:txBody>

</xml_diff>

<commit_message>
fixed data scrape from sharepoint
</commit_message>
<xml_diff>
--- a/Data/Output/Robotic Process Automation PMO.pptx
+++ b/Data/Output/Robotic Process Automation PMO.pptx
@@ -3868,7 +3868,7 @@
           <p:cNvPr id="3" name="TextBox 2">
             <a:extLst>
               <a:ext uri="{FF2B5EF4-FFF2-40B4-BE49-F238E27FC236}">
-                <a16:creationId xmlns:a16="http://schemas.microsoft.com/office/drawing/2014/main" id="{25E6C90F-C084-410C-8ABD-AC585E47F8B0}"/>
+                <a16:creationId xmlns:a16="http://schemas.microsoft.com/office/drawing/2014/main" id="{C540DBEF-B63B-4887-BD41-E69588D12B4D}"/>
               </a:ext>
             </a:extLst>
           </p:cNvPr>
@@ -3969,7 +3969,7 @@
           <p:cNvPr id="3" name="Table Placeholder 2">
             <a:extLst>
               <a:ext uri="{FF2B5EF4-FFF2-40B4-BE49-F238E27FC236}">
-                <a16:creationId xmlns:a16="http://schemas.microsoft.com/office/drawing/2014/main" id="{027CDD38-7349-41FA-8D0B-DE5A196EBACB}"/>
+                <a16:creationId xmlns:a16="http://schemas.microsoft.com/office/drawing/2014/main" id="{F2074A19-C701-42BB-9B53-32B00B259C99}"/>
               </a:ext>
             </a:extLst>
           </p:cNvPr>
@@ -3980,7 +3980,7 @@
             <p:ph type="tbl" sz="quarter" idx="13"/>
             <p:extLst>
               <p:ext uri="{D42A27DB-BD31-4B8C-83A1-F6EECF244321}">
-                <p14:modId xmlns:p14="http://schemas.microsoft.com/office/powerpoint/2010/main" val="672040501"/>
+                <p14:modId xmlns:p14="http://schemas.microsoft.com/office/powerpoint/2010/main" val="4254168239"/>
               </p:ext>
             </p:extLst>
           </p:nvPr>
@@ -3999,14 +3999,14 @@
                 <a:gridCol w="5040313">
                   <a:extLst>
                     <a:ext uri="{9D8B030D-6E8A-4147-A177-3AD203B41FA5}">
-                      <a16:colId xmlns:a16="http://schemas.microsoft.com/office/drawing/2014/main" val="2700466602"/>
+                      <a16:colId xmlns:a16="http://schemas.microsoft.com/office/drawing/2014/main" val="3468104084"/>
                     </a:ext>
                   </a:extLst>
                 </a:gridCol>
                 <a:gridCol w="5040313">
                   <a:extLst>
                     <a:ext uri="{9D8B030D-6E8A-4147-A177-3AD203B41FA5}">
-                      <a16:colId xmlns:a16="http://schemas.microsoft.com/office/drawing/2014/main" val="2982343457"/>
+                      <a16:colId xmlns:a16="http://schemas.microsoft.com/office/drawing/2014/main" val="1668649086"/>
                     </a:ext>
                   </a:extLst>
                 </a:gridCol>
@@ -4040,7 +4040,7 @@
                 </a:tc>
                 <a:extLst>
                   <a:ext uri="{0D108BD9-81ED-4DB2-BD59-A6C34878D82A}">
-                    <a16:rowId xmlns:a16="http://schemas.microsoft.com/office/drawing/2014/main" val="247840495"/>
+                    <a16:rowId xmlns:a16="http://schemas.microsoft.com/office/drawing/2014/main" val="1181918249"/>
                   </a:ext>
                 </a:extLst>
               </a:tr>
@@ -4073,7 +4073,7 @@
                 </a:tc>
                 <a:extLst>
                   <a:ext uri="{0D108BD9-81ED-4DB2-BD59-A6C34878D82A}">
-                    <a16:rowId xmlns:a16="http://schemas.microsoft.com/office/drawing/2014/main" val="1084646597"/>
+                    <a16:rowId xmlns:a16="http://schemas.microsoft.com/office/drawing/2014/main" val="3885566199"/>
                   </a:ext>
                 </a:extLst>
               </a:tr>
@@ -4106,7 +4106,7 @@
                 </a:tc>
                 <a:extLst>
                   <a:ext uri="{0D108BD9-81ED-4DB2-BD59-A6C34878D82A}">
-                    <a16:rowId xmlns:a16="http://schemas.microsoft.com/office/drawing/2014/main" val="3284331429"/>
+                    <a16:rowId xmlns:a16="http://schemas.microsoft.com/office/drawing/2014/main" val="717048760"/>
                   </a:ext>
                 </a:extLst>
               </a:tr>
@@ -4119,7 +4119,7 @@
           <p:cNvPr id="4" name="TextBox 3">
             <a:extLst>
               <a:ext uri="{FF2B5EF4-FFF2-40B4-BE49-F238E27FC236}">
-                <a16:creationId xmlns:a16="http://schemas.microsoft.com/office/drawing/2014/main" id="{C2DBCB1D-322D-4D4A-899B-C01895F30DF5}"/>
+                <a16:creationId xmlns:a16="http://schemas.microsoft.com/office/drawing/2014/main" id="{6E76F993-B019-4873-ABFF-B22B7B634F62}"/>
               </a:ext>
             </a:extLst>
           </p:cNvPr>
@@ -4215,30 +4215,208 @@
           </a:p>
         </p:txBody>
       </p:sp>
-      <p:sp>
-        <p:nvSpPr>
-          <p:cNvPr id="5" name="Table Placeholder 4">
-            <a:extLst>
-              <a:ext uri="{FF2B5EF4-FFF2-40B4-BE49-F238E27FC236}">
-                <a16:creationId xmlns:a16="http://schemas.microsoft.com/office/drawing/2014/main" id="{7C478F99-2C5A-4FB0-969D-25AF82E52757}"/>
-              </a:ext>
-            </a:extLst>
-          </p:cNvPr>
-          <p:cNvSpPr>
-            <a:spLocks noGrp="1"/>
-          </p:cNvSpPr>
+      <p:graphicFrame>
+        <p:nvGraphicFramePr>
+          <p:cNvPr id="2" name="Table Placeholder 1">
+            <a:extLst>
+              <a:ext uri="{FF2B5EF4-FFF2-40B4-BE49-F238E27FC236}">
+                <a16:creationId xmlns:a16="http://schemas.microsoft.com/office/drawing/2014/main" id="{0303773D-070B-4FCF-8C6E-562D1ED7B153}"/>
+              </a:ext>
+            </a:extLst>
+          </p:cNvPr>
+          <p:cNvGraphicFramePr>
+            <a:graphicFrameLocks noGrp="1"/>
+          </p:cNvGraphicFramePr>
           <p:nvPr>
             <p:ph type="tbl" sz="quarter" idx="13"/>
-          </p:nvPr>
-        </p:nvSpPr>
-        <p:spPr/>
-      </p:sp>
-      <p:sp>
-        <p:nvSpPr>
-          <p:cNvPr id="2" name="TextBox 1">
-            <a:extLst>
-              <a:ext uri="{FF2B5EF4-FFF2-40B4-BE49-F238E27FC236}">
-                <a16:creationId xmlns:a16="http://schemas.microsoft.com/office/drawing/2014/main" id="{7E49380B-318C-4AB3-8873-269278028786}"/>
+            <p:extLst>
+              <p:ext uri="{D42A27DB-BD31-4B8C-83A1-F6EECF244321}">
+                <p14:modId xmlns:p14="http://schemas.microsoft.com/office/powerpoint/2010/main" val="2013364557"/>
+              </p:ext>
+            </p:extLst>
+          </p:nvPr>
+        </p:nvGraphicFramePr>
+        <p:xfrm>
+          <a:off x="1055688" y="2241550"/>
+          <a:ext cx="10080625" cy="3746500"/>
+        </p:xfrm>
+        <a:graphic>
+          <a:graphicData uri="http://schemas.openxmlformats.org/drawingml/2006/table">
+            <a:tbl>
+              <a:tblPr firstRow="1" bandRow="1">
+                <a:tableStyleId>{5C22544A-7EE6-4342-B048-85BDC9FD1C3A}</a:tableStyleId>
+              </a:tblPr>
+              <a:tblGrid>
+                <a:gridCol w="3360208">
+                  <a:extLst>
+                    <a:ext uri="{9D8B030D-6E8A-4147-A177-3AD203B41FA5}">
+                      <a16:colId xmlns:a16="http://schemas.microsoft.com/office/drawing/2014/main" val="2565698457"/>
+                    </a:ext>
+                  </a:extLst>
+                </a:gridCol>
+                <a:gridCol w="3360208">
+                  <a:extLst>
+                    <a:ext uri="{9D8B030D-6E8A-4147-A177-3AD203B41FA5}">
+                      <a16:colId xmlns:a16="http://schemas.microsoft.com/office/drawing/2014/main" val="1110650861"/>
+                    </a:ext>
+                  </a:extLst>
+                </a:gridCol>
+                <a:gridCol w="3360208">
+                  <a:extLst>
+                    <a:ext uri="{9D8B030D-6E8A-4147-A177-3AD203B41FA5}">
+                      <a16:colId xmlns:a16="http://schemas.microsoft.com/office/drawing/2014/main" val="355195319"/>
+                    </a:ext>
+                  </a:extLst>
+                </a:gridCol>
+              </a:tblGrid>
+              <a:tr h="370840">
+                <a:tc>
+                  <a:txBody>
+                    <a:bodyPr/>
+                    <a:lstStyle/>
+                    <a:p>
+                      <a:r>
+                        <a:rPr lang="en-US"/>
+                        <a:t>Risk Description</a:t>
+                      </a:r>
+                    </a:p>
+                  </a:txBody>
+                  <a:tcPr/>
+                </a:tc>
+                <a:tc>
+                  <a:txBody>
+                    <a:bodyPr/>
+                    <a:lstStyle/>
+                    <a:p>
+                      <a:r>
+                        <a:rPr lang="en-US"/>
+                        <a:t>Severity</a:t>
+                      </a:r>
+                    </a:p>
+                  </a:txBody>
+                  <a:tcPr/>
+                </a:tc>
+                <a:tc>
+                  <a:txBody>
+                    <a:bodyPr/>
+                    <a:lstStyle/>
+                    <a:p>
+                      <a:r>
+                        <a:rPr lang="en-US"/>
+                        <a:t>Owner</a:t>
+                      </a:r>
+                    </a:p>
+                  </a:txBody>
+                  <a:tcPr/>
+                </a:tc>
+                <a:extLst>
+                  <a:ext uri="{0D108BD9-81ED-4DB2-BD59-A6C34878D82A}">
+                    <a16:rowId xmlns:a16="http://schemas.microsoft.com/office/drawing/2014/main" val="343855178"/>
+                  </a:ext>
+                </a:extLst>
+              </a:tr>
+              <a:tr h="370840">
+                <a:tc>
+                  <a:txBody>
+                    <a:bodyPr/>
+                    <a:lstStyle/>
+                    <a:p>
+                      <a:r>
+                        <a:rPr lang="en-US"/>
+                        <a:t>If something happens, then something bad will happen to the program</a:t>
+                      </a:r>
+                    </a:p>
+                  </a:txBody>
+                  <a:tcPr/>
+                </a:tc>
+                <a:tc>
+                  <a:txBody>
+                    <a:bodyPr/>
+                    <a:lstStyle/>
+                    <a:p>
+                      <a:r>
+                        <a:rPr lang="en-US"/>
+                        <a:t>High</a:t>
+                      </a:r>
+                    </a:p>
+                  </a:txBody>
+                  <a:tcPr/>
+                </a:tc>
+                <a:tc>
+                  <a:txBody>
+                    <a:bodyPr/>
+                    <a:lstStyle/>
+                    <a:p>
+                      <a:r>
+                        <a:rPr lang="en-US"/>
+                        <a:t>Elevate Bot</a:t>
+                      </a:r>
+                    </a:p>
+                  </a:txBody>
+                  <a:tcPr/>
+                </a:tc>
+                <a:extLst>
+                  <a:ext uri="{0D108BD9-81ED-4DB2-BD59-A6C34878D82A}">
+                    <a16:rowId xmlns:a16="http://schemas.microsoft.com/office/drawing/2014/main" val="52090590"/>
+                  </a:ext>
+                </a:extLst>
+              </a:tr>
+              <a:tr h="370840">
+                <a:tc>
+                  <a:txBody>
+                    <a:bodyPr/>
+                    <a:lstStyle/>
+                    <a:p>
+                      <a:r>
+                        <a:rPr lang="en-US"/>
+                        <a:t>If the bot gets a mind of its own, then we will need to kill it</a:t>
+                      </a:r>
+                    </a:p>
+                  </a:txBody>
+                  <a:tcPr/>
+                </a:tc>
+                <a:tc>
+                  <a:txBody>
+                    <a:bodyPr/>
+                    <a:lstStyle/>
+                    <a:p>
+                      <a:r>
+                        <a:rPr lang="en-US"/>
+                        <a:t>Medium</a:t>
+                      </a:r>
+                    </a:p>
+                  </a:txBody>
+                  <a:tcPr/>
+                </a:tc>
+                <a:tc>
+                  <a:txBody>
+                    <a:bodyPr/>
+                    <a:lstStyle/>
+                    <a:p>
+                      <a:r>
+                        <a:rPr lang="en-US"/>
+                        <a:t>Elevate Bot</a:t>
+                      </a:r>
+                    </a:p>
+                  </a:txBody>
+                  <a:tcPr/>
+                </a:tc>
+                <a:extLst>
+                  <a:ext uri="{0D108BD9-81ED-4DB2-BD59-A6C34878D82A}">
+                    <a16:rowId xmlns:a16="http://schemas.microsoft.com/office/drawing/2014/main" val="3933712201"/>
+                  </a:ext>
+                </a:extLst>
+              </a:tr>
+            </a:tbl>
+          </a:graphicData>
+        </a:graphic>
+      </p:graphicFrame>
+      <p:sp>
+        <p:nvSpPr>
+          <p:cNvPr id="3" name="TextBox 2">
+            <a:extLst>
+              <a:ext uri="{FF2B5EF4-FFF2-40B4-BE49-F238E27FC236}">
+                <a16:creationId xmlns:a16="http://schemas.microsoft.com/office/drawing/2014/main" id="{2E7D2E09-3D1C-457A-A124-0949748B3CFE}"/>
               </a:ext>
             </a:extLst>
           </p:cNvPr>

</xml_diff>